<commit_message>
reword soln CP_more_counting, update #team probs on last of slides9f
</commit_message>
<xml_diff>
--- a/restricted/slides9f.pptx
+++ b/restricted/slides9f.pptx
@@ -5367,22 +5367,7 @@
                 <a:uFillTx/>
                 <a:latin typeface="Comic Sans MS" pitchFamily="66" charset="0"/>
               </a:rPr>
-              <a:t>Albert R Meyer</a:t>
-            </a:r>
-            <a:r>
-              <a:rPr kumimoji="0" lang="en-US" sz="1200" b="0" i="0" u="none" strike="noStrike" kern="1200" cap="none" spc="0" normalizeH="0" baseline="0" noProof="0" dirty="0" smtClean="0">
-                <a:ln>
-                  <a:noFill/>
-                </a:ln>
-                <a:solidFill>
-                  <a:schemeClr val="tx1"/>
-                </a:solidFill>
-                <a:effectLst/>
-                <a:uLnTx/>
-                <a:uFillTx/>
-                <a:latin typeface="Comic Sans MS" pitchFamily="66" charset="0"/>
-              </a:rPr>
-              <a:t>,           April 9, 2010</a:t>
+              <a:t>Albert R Meyer,           April 9, 2010</a:t>
             </a:r>
             <a:endParaRPr kumimoji="0" lang="en-US" sz="1200" b="0" i="0" u="none" strike="noStrike" kern="1200" cap="none" spc="0" normalizeH="0" baseline="0" noProof="0" dirty="0">
               <a:ln>
@@ -28004,11 +27989,11 @@
           <a:p>
             <a:pPr algn="ctr" eaLnBrk="1" hangingPunct="1"/>
             <a:r>
-              <a:rPr lang="en-US" sz="10600" dirty="0" smtClean="0"/>
+              <a:rPr lang="en-US" sz="10600" smtClean="0"/>
               <a:t>1</a:t>
             </a:r>
             <a:r>
-              <a:rPr lang="en-US" sz="10600" b="1" dirty="0" smtClean="0">
+              <a:rPr lang="en-US" sz="10600" b="1" smtClean="0">
                 <a:latin typeface="Euclid Symbol" charset="2"/>
                 <a:cs typeface="Euclid Symbol" charset="2"/>
                 <a:sym typeface="Euclid Symbol" pitchFamily="18" charset="2"/>
@@ -28016,10 +28001,10 @@
               <a:t>−</a:t>
             </a:r>
             <a:r>
-              <a:rPr lang="en-US" sz="10600" dirty="0" smtClean="0">
+              <a:rPr lang="en-US" sz="10600" smtClean="0">
                 <a:sym typeface="Euclid Symbol" pitchFamily="18" charset="2"/>
               </a:rPr>
-              <a:t>3</a:t>
+              <a:t>4</a:t>
             </a:r>
             <a:endParaRPr lang="en-US" sz="10600" dirty="0"/>
           </a:p>

</xml_diff>